<commit_message>
Added link to github in pptx
</commit_message>
<xml_diff>
--- a/Presentation.pptx
+++ b/Presentation.pptx
@@ -247,7 +247,7 @@
           <a:p>
             <a:fld id="{78D5E657-C75E-4190-B3C3-105C9C4260DF}" type="datetimeFigureOut">
               <a:rPr lang="en-AU" smtClean="0"/>
-              <a:t>24/05/2015</a:t>
+              <a:t>25/05/2015</a:t>
             </a:fld>
             <a:endParaRPr lang="en-AU"/>
           </a:p>
@@ -412,7 +412,7 @@
           <a:p>
             <a:fld id="{B2842A88-9C46-4A82-BC64-6521039314F7}" type="datetimeFigureOut">
               <a:rPr lang="en-AU" smtClean="0"/>
-              <a:t>24/05/2015</a:t>
+              <a:t>25/05/2015</a:t>
             </a:fld>
             <a:endParaRPr lang="en-AU"/>
           </a:p>
@@ -1338,7 +1338,7 @@
             <a:fld id="{D5202F35-1E60-44E7-A8CA-65A043171768}" type="datetime1">
               <a:rPr lang="en-AU" smtClean="0"/>
               <a:pPr/>
-              <a:t>24/05/2015</a:t>
+              <a:t>25/05/2015</a:t>
             </a:fld>
             <a:endParaRPr lang="en-AU"/>
           </a:p>
@@ -2533,7 +2533,7 @@
           <a:p>
             <a:fld id="{81365592-B95A-4E1B-8688-B9BAC9237151}" type="datetime1">
               <a:rPr lang="en-AU" smtClean="0"/>
-              <a:t>24/05/2015</a:t>
+              <a:t>25/05/2015</a:t>
             </a:fld>
             <a:endParaRPr lang="en-AU"/>
           </a:p>
@@ -3329,7 +3329,7 @@
           <a:p>
             <a:fld id="{AD4CC7D5-0035-4193-9F83-5592C7C73289}" type="datetime1">
               <a:rPr lang="en-AU" smtClean="0"/>
-              <a:t>24/05/2015</a:t>
+              <a:t>25/05/2015</a:t>
             </a:fld>
             <a:endParaRPr lang="en-AU"/>
           </a:p>
@@ -6061,7 +6061,7 @@
           <a:p>
             <a:fld id="{AB9362CC-52A7-47E4-B186-2D952EF52122}" type="datetime1">
               <a:rPr lang="en-AU" smtClean="0"/>
-              <a:t>24/05/2015</a:t>
+              <a:t>25/05/2015</a:t>
             </a:fld>
             <a:endParaRPr lang="en-AU"/>
           </a:p>
@@ -6160,7 +6160,7 @@
           <a:p>
             <a:fld id="{F27C2E27-7A8C-4707-AD07-B4E8FCCC602F}" type="datetime1">
               <a:rPr lang="en-AU" smtClean="0"/>
-              <a:t>24/05/2015</a:t>
+              <a:t>25/05/2015</a:t>
             </a:fld>
             <a:endParaRPr lang="en-AU"/>
           </a:p>
@@ -6289,7 +6289,7 @@
           <a:p>
             <a:fld id="{3345A4CD-9276-444C-86E6-50A9930741D5}" type="datetime1">
               <a:rPr lang="en-AU" smtClean="0"/>
-              <a:t>24/05/2015</a:t>
+              <a:t>25/05/2015</a:t>
             </a:fld>
             <a:endParaRPr lang="en-AU"/>
           </a:p>
@@ -6588,7 +6588,7 @@
           <a:p>
             <a:fld id="{1695342B-6DF4-46BE-B3B0-0C35B6698BA5}" type="datetime1">
               <a:rPr lang="en-AU" smtClean="0"/>
-              <a:t>24/05/2015</a:t>
+              <a:t>25/05/2015</a:t>
             </a:fld>
             <a:endParaRPr lang="en-AU"/>
           </a:p>
@@ -7019,7 +7019,7 @@
             <a:fld id="{2AB80E0E-1F2C-4E6E-B168-928DCCD9FC96}" type="datetime1">
               <a:rPr lang="en-AU" smtClean="0"/>
               <a:pPr/>
-              <a:t>24/05/2015</a:t>
+              <a:t>25/05/2015</a:t>
             </a:fld>
             <a:endParaRPr lang="en-AU"/>
           </a:p>
@@ -7432,7 +7432,7 @@
             <a:fld id="{2AB80E0E-1F2C-4E6E-B168-928DCCD9FC96}" type="datetime1">
               <a:rPr lang="en-AU" smtClean="0"/>
               <a:pPr/>
-              <a:t>24/05/2015</a:t>
+              <a:t>25/05/2015</a:t>
             </a:fld>
             <a:endParaRPr lang="en-AU"/>
           </a:p>
@@ -8064,7 +8064,7 @@
             <a:fld id="{2AB80E0E-1F2C-4E6E-B168-928DCCD9FC96}" type="datetime1">
               <a:rPr lang="en-AU" smtClean="0"/>
               <a:pPr/>
-              <a:t>24/05/2015</a:t>
+              <a:t>25/05/2015</a:t>
             </a:fld>
             <a:endParaRPr lang="en-AU"/>
           </a:p>
@@ -8477,7 +8477,7 @@
             <a:fld id="{2AB80E0E-1F2C-4E6E-B168-928DCCD9FC96}" type="datetime1">
               <a:rPr lang="en-AU" smtClean="0"/>
               <a:pPr/>
-              <a:t>24/05/2015</a:t>
+              <a:t>25/05/2015</a:t>
             </a:fld>
             <a:endParaRPr lang="en-AU"/>
           </a:p>
@@ -8890,7 +8890,7 @@
             <a:fld id="{2AB80E0E-1F2C-4E6E-B168-928DCCD9FC96}" type="datetime1">
               <a:rPr lang="en-AU" smtClean="0"/>
               <a:pPr/>
-              <a:t>24/05/2015</a:t>
+              <a:t>25/05/2015</a:t>
             </a:fld>
             <a:endParaRPr lang="en-AU"/>
           </a:p>
@@ -9303,7 +9303,7 @@
             <a:fld id="{2AB80E0E-1F2C-4E6E-B168-928DCCD9FC96}" type="datetime1">
               <a:rPr lang="en-AU" smtClean="0"/>
               <a:pPr/>
-              <a:t>24/05/2015</a:t>
+              <a:t>25/05/2015</a:t>
             </a:fld>
             <a:endParaRPr lang="en-AU"/>
           </a:p>
@@ -9756,7 +9756,7 @@
           <a:p>
             <a:fld id="{94480E61-56EE-4ADF-8779-ECE37FDE8329}" type="datetime1">
               <a:rPr lang="en-AU" smtClean="0"/>
-              <a:t>24/05/2015</a:t>
+              <a:t>25/05/2015</a:t>
             </a:fld>
             <a:endParaRPr lang="en-AU"/>
           </a:p>
@@ -10197,7 +10197,7 @@
           <a:p>
             <a:fld id="{18DF6330-03F8-4D88-A646-B563CDC9AF8D}" type="datetime1">
               <a:rPr lang="en-AU" smtClean="0"/>
-              <a:t>24/05/2015</a:t>
+              <a:t>25/05/2015</a:t>
             </a:fld>
             <a:endParaRPr lang="en-AU"/>
           </a:p>
@@ -10548,7 +10548,7 @@
           <a:p>
             <a:fld id="{D0044588-2A83-44A9-A3CC-C3B7B17A5165}" type="datetime1">
               <a:rPr lang="en-AU" smtClean="0"/>
-              <a:t>24/05/2015</a:t>
+              <a:t>25/05/2015</a:t>
             </a:fld>
             <a:endParaRPr lang="en-AU"/>
           </a:p>
@@ -10989,7 +10989,7 @@
           <a:p>
             <a:fld id="{41D22EE6-4B31-412E-8723-91D4ADC54A19}" type="datetime1">
               <a:rPr lang="en-AU" smtClean="0"/>
-              <a:t>24/05/2015</a:t>
+              <a:t>25/05/2015</a:t>
             </a:fld>
             <a:endParaRPr lang="en-AU"/>
           </a:p>
@@ -11340,7 +11340,7 @@
           <a:p>
             <a:fld id="{DA261D82-8DC8-458B-8902-24081A8340A2}" type="datetime1">
               <a:rPr lang="en-AU" smtClean="0"/>
-              <a:t>24/05/2015</a:t>
+              <a:t>25/05/2015</a:t>
             </a:fld>
             <a:endParaRPr lang="en-AU"/>
           </a:p>
@@ -11683,7 +11683,7 @@
           <a:p>
             <a:fld id="{420BB56F-B44B-46AA-97B1-CA041AECB16C}" type="datetime1">
               <a:rPr lang="en-AU" smtClean="0"/>
-              <a:t>24/05/2015</a:t>
+              <a:t>25/05/2015</a:t>
             </a:fld>
             <a:endParaRPr lang="en-AU"/>
           </a:p>
@@ -12201,7 +12201,7 @@
           <a:p>
             <a:fld id="{1695342B-6DF4-46BE-B3B0-0C35B6698BA5}" type="datetime1">
               <a:rPr lang="en-AU" smtClean="0"/>
-              <a:t>24/05/2015</a:t>
+              <a:t>25/05/2015</a:t>
             </a:fld>
             <a:endParaRPr lang="en-AU"/>
           </a:p>
@@ -12435,7 +12435,7 @@
           <a:p>
             <a:fld id="{5DF3D236-8947-4982-93B0-9FCFCBDDAAAA}" type="datetime1">
               <a:rPr lang="en-AU" smtClean="0"/>
-              <a:t>24/05/2015</a:t>
+              <a:t>25/05/2015</a:t>
             </a:fld>
             <a:endParaRPr lang="en-AU"/>
           </a:p>
@@ -12669,7 +12669,7 @@
           <a:p>
             <a:fld id="{07585B30-36BA-40E4-B8EC-C9A276584755}" type="datetime1">
               <a:rPr lang="en-AU" smtClean="0"/>
-              <a:t>24/05/2015</a:t>
+              <a:t>25/05/2015</a:t>
             </a:fld>
             <a:endParaRPr lang="en-AU"/>
           </a:p>
@@ -12903,7 +12903,7 @@
           <a:p>
             <a:fld id="{0101A2FF-CDC1-40C1-873E-97295C411EAE}" type="datetime1">
               <a:rPr lang="en-AU" smtClean="0"/>
-              <a:t>24/05/2015</a:t>
+              <a:t>25/05/2015</a:t>
             </a:fld>
             <a:endParaRPr lang="en-AU"/>
           </a:p>
@@ -13137,7 +13137,7 @@
           <a:p>
             <a:fld id="{BA96EB8D-2F5F-4C3C-9779-37FE3E8D3195}" type="datetime1">
               <a:rPr lang="en-AU" smtClean="0"/>
-              <a:t>24/05/2015</a:t>
+              <a:t>25/05/2015</a:t>
             </a:fld>
             <a:endParaRPr lang="en-AU"/>
           </a:p>
@@ -13371,7 +13371,7 @@
           <a:p>
             <a:fld id="{D0C959DE-A79C-459E-8034-77D6B0EBD4F3}" type="datetime1">
               <a:rPr lang="en-AU" smtClean="0"/>
-              <a:t>24/05/2015</a:t>
+              <a:t>25/05/2015</a:t>
             </a:fld>
             <a:endParaRPr lang="en-AU"/>
           </a:p>
@@ -13613,7 +13613,7 @@
           <a:p>
             <a:fld id="{C6CAFF4A-1ACD-4FAE-A33D-FFAFDD26098E}" type="datetime1">
               <a:rPr lang="en-AU" smtClean="0"/>
-              <a:t>24/05/2015</a:t>
+              <a:t>25/05/2015</a:t>
             </a:fld>
             <a:endParaRPr lang="en-AU"/>
           </a:p>
@@ -13847,7 +13847,7 @@
           <a:p>
             <a:fld id="{204F744D-E263-4258-9535-CA1100C058C5}" type="datetime1">
               <a:rPr lang="en-AU" smtClean="0"/>
-              <a:t>24/05/2015</a:t>
+              <a:t>25/05/2015</a:t>
             </a:fld>
             <a:endParaRPr lang="en-AU"/>
           </a:p>
@@ -14081,7 +14081,7 @@
           <a:p>
             <a:fld id="{E19FA2E3-1277-4A05-A117-6DAAA0A59214}" type="datetime1">
               <a:rPr lang="en-AU" smtClean="0"/>
-              <a:t>24/05/2015</a:t>
+              <a:t>25/05/2015</a:t>
             </a:fld>
             <a:endParaRPr lang="en-AU"/>
           </a:p>
@@ -14315,7 +14315,7 @@
           <a:p>
             <a:fld id="{CD818C87-C82A-4436-B0CF-391780521B37}" type="datetime1">
               <a:rPr lang="en-AU" smtClean="0"/>
-              <a:t>24/05/2015</a:t>
+              <a:t>25/05/2015</a:t>
             </a:fld>
             <a:endParaRPr lang="en-AU"/>
           </a:p>
@@ -14768,7 +14768,7 @@
           <a:p>
             <a:fld id="{FAE3E39A-5791-4850-A246-16D6E2F6AEB6}" type="datetime1">
               <a:rPr lang="en-AU" smtClean="0"/>
-              <a:t>24/05/2015</a:t>
+              <a:t>25/05/2015</a:t>
             </a:fld>
             <a:endParaRPr lang="en-AU"/>
           </a:p>
@@ -15002,7 +15002,7 @@
           <a:p>
             <a:fld id="{7C98056B-DCE9-4980-AB4F-9933835EDDF0}" type="datetime1">
               <a:rPr lang="en-AU" smtClean="0"/>
-              <a:t>24/05/2015</a:t>
+              <a:t>25/05/2015</a:t>
             </a:fld>
             <a:endParaRPr lang="en-AU"/>
           </a:p>
@@ -16532,7 +16532,7 @@
           <a:p>
             <a:fld id="{2AB80E0E-1F2C-4E6E-B168-928DCCD9FC96}" type="datetime1">
               <a:rPr lang="en-AU" smtClean="0"/>
-              <a:t>24/05/2015</a:t>
+              <a:t>25/05/2015</a:t>
             </a:fld>
             <a:endParaRPr lang="en-AU"/>
           </a:p>
@@ -16810,7 +16810,7 @@
             <a:fld id="{D5202F35-1E60-44E7-A8CA-65A043171768}" type="datetime1">
               <a:rPr lang="en-AU" smtClean="0"/>
               <a:pPr/>
-              <a:t>24/05/2015</a:t>
+              <a:t>25/05/2015</a:t>
             </a:fld>
             <a:endParaRPr lang="en-AU"/>
           </a:p>
@@ -17247,7 +17247,7 @@
             <a:fld id="{094FD292-6CBB-42F0-8BF6-EA5D415F7BA5}" type="datetime1">
               <a:rPr lang="en-AU" smtClean="0"/>
               <a:pPr/>
-              <a:t>24/05/2015</a:t>
+              <a:t>25/05/2015</a:t>
             </a:fld>
             <a:endParaRPr lang="en-AU" dirty="0"/>
           </a:p>
@@ -20837,7 +20837,7 @@
                                         <p:tgtEl>
                                           <p:spTgt spid="3">
                                             <p:txEl>
-                                              <p:charRg st="11" end="30"/>
+                                              <p:pRg st="1" end="1"/>
                                             </p:txEl>
                                           </p:spTgt>
                                         </p:tgtEl>
@@ -20868,7 +20868,7 @@
                                         <p:tgtEl>
                                           <p:spTgt spid="3">
                                             <p:txEl>
-                                              <p:charRg st="30" end="48"/>
+                                              <p:pRg st="2" end="2"/>
                                             </p:txEl>
                                           </p:spTgt>
                                         </p:tgtEl>
@@ -20899,7 +20899,7 @@
                                         <p:tgtEl>
                                           <p:spTgt spid="3">
                                             <p:txEl>
-                                              <p:charRg st="48" end="65"/>
+                                              <p:pRg st="3" end="3"/>
                                             </p:txEl>
                                           </p:spTgt>
                                         </p:tgtEl>
@@ -20930,7 +20930,7 @@
                                         <p:tgtEl>
                                           <p:spTgt spid="3">
                                             <p:txEl>
-                                              <p:charRg st="65" end="83"/>
+                                              <p:pRg st="4" end="4"/>
                                             </p:txEl>
                                           </p:spTgt>
                                         </p:tgtEl>
@@ -22530,7 +22530,38 @@
               <a:rPr lang="en-AU" dirty="0" err="1" smtClean="0"/>
               <a:t>robdmoore</a:t>
             </a:r>
-            <a:endParaRPr lang="en-AU" dirty="0"/>
+            <a:endParaRPr lang="en-AU" dirty="0" smtClean="0"/>
+          </a:p>
+          <a:p>
+            <a:r>
+              <a:rPr lang="en-AU" dirty="0" smtClean="0"/>
+              <a:t>robdmoore.id.au</a:t>
+            </a:r>
+          </a:p>
+          <a:p>
+            <a:endParaRPr lang="en-AU" sz="1800" dirty="0" smtClean="0"/>
+          </a:p>
+          <a:p>
+            <a:endParaRPr lang="en-AU" sz="1800" dirty="0"/>
+          </a:p>
+          <a:p>
+            <a:r>
+              <a:rPr lang="en-AU" sz="1800" dirty="0" smtClean="0"/>
+              <a:t>github.com/</a:t>
+            </a:r>
+            <a:r>
+              <a:rPr lang="en-AU" sz="1800" dirty="0" err="1" smtClean="0"/>
+              <a:t>robdmoore</a:t>
+            </a:r>
+            <a:r>
+              <a:rPr lang="en-AU" sz="1800" dirty="0" smtClean="0"/>
+              <a:t>/</a:t>
+            </a:r>
+            <a:r>
+              <a:rPr lang="en-AU" sz="1800" dirty="0" err="1" smtClean="0"/>
+              <a:t>TestingPatternsWithDossierPresentation</a:t>
+            </a:r>
+            <a:endParaRPr lang="en-AU" sz="1800" dirty="0"/>
           </a:p>
         </p:txBody>
       </p:sp>
@@ -24832,29 +24863,6 @@
 </file>
 
 <file path=customXml/item1.xml><?xml version="1.0" encoding="utf-8"?>
-<p:properties xmlns:p="http://schemas.microsoft.com/office/2006/metadata/properties" xmlns:xsi="http://www.w3.org/2001/XMLSchema-instance" xmlns:pc="http://schemas.microsoft.com/office/infopath/2007/PartnerControls">
-  <documentManagement>
-    <SharedWithUsers xmlns="a0705aab-28ed-4f14-9e72-801ff7570ecf">
-      <UserInfo>
-        <DisplayName/>
-        <AccountId xsi:nil="true"/>
-        <AccountType/>
-      </UserInfo>
-    </SharedWithUsers>
-  </documentManagement>
-</p:properties>
-</file>
-
-<file path=customXml/item2.xml><?xml version="1.0" encoding="utf-8"?>
-<?mso-contentType ?>
-<FormTemplates xmlns="http://schemas.microsoft.com/sharepoint/v3/contenttype/forms">
-  <Display>DocumentLibraryForm</Display>
-  <Edit>DocumentLibraryForm</Edit>
-  <New>DocumentLibraryForm</New>
-</FormTemplates>
-</file>
-
-<file path=customXml/item3.xml><?xml version="1.0" encoding="utf-8"?>
 <ct:contentTypeSchema xmlns:ct="http://schemas.microsoft.com/office/2006/metadata/contentType" xmlns:ma="http://schemas.microsoft.com/office/2006/metadata/properties/metaAttributes" ct:_="" ma:_="" ma:contentTypeName="Document" ma:contentTypeID="0x010100E6C79711059E8D46ADE79FA0C3FB19E4" ma:contentTypeVersion="3" ma:contentTypeDescription="Create a new document." ma:contentTypeScope="" ma:versionID="daae2b56741e0abbe810b87540851dcc">
   <xsd:schema xmlns:xsd="http://www.w3.org/2001/XMLSchema" xmlns:xs="http://www.w3.org/2001/XMLSchema" xmlns:p="http://schemas.microsoft.com/office/2006/metadata/properties" xmlns:ns2="a0705aab-28ed-4f14-9e72-801ff7570ecf" targetNamespace="http://schemas.microsoft.com/office/2006/metadata/properties" ma:root="true" ma:fieldsID="f0b30d34b8520fcf8862db976c97c465" ns2:_="">
     <xsd:import namespace="a0705aab-28ed-4f14-9e72-801ff7570ecf"/>
@@ -25008,31 +25016,30 @@
 </ct:contentTypeSchema>
 </file>
 
-<file path=customXml/itemProps1.xml><?xml version="1.0" encoding="utf-8"?>
-<ds:datastoreItem xmlns:ds="http://schemas.openxmlformats.org/officeDocument/2006/customXml" ds:itemID="{1B9FA1EF-CD23-4139-920B-9EDB05CD48C7}">
-  <ds:schemaRefs>
-    <ds:schemaRef ds:uri="http://purl.org/dc/terms/"/>
-    <ds:schemaRef ds:uri="a0705aab-28ed-4f14-9e72-801ff7570ecf"/>
-    <ds:schemaRef ds:uri="http://schemas.microsoft.com/office/infopath/2007/PartnerControls"/>
-    <ds:schemaRef ds:uri="http://purl.org/dc/elements/1.1/"/>
-    <ds:schemaRef ds:uri="http://purl.org/dc/dcmitype/"/>
-    <ds:schemaRef ds:uri="http://schemas.microsoft.com/office/2006/documentManagement/types"/>
-    <ds:schemaRef ds:uri="http://schemas.openxmlformats.org/package/2006/metadata/core-properties"/>
-    <ds:schemaRef ds:uri="http://schemas.microsoft.com/office/2006/metadata/properties"/>
-    <ds:schemaRef ds:uri="http://www.w3.org/XML/1998/namespace"/>
-  </ds:schemaRefs>
-</ds:datastoreItem>
+<file path=customXml/item2.xml><?xml version="1.0" encoding="utf-8"?>
+<?mso-contentType ?>
+<FormTemplates xmlns="http://schemas.microsoft.com/sharepoint/v3/contenttype/forms">
+  <Display>DocumentLibraryForm</Display>
+  <Edit>DocumentLibraryForm</Edit>
+  <New>DocumentLibraryForm</New>
+</FormTemplates>
 </file>
 
-<file path=customXml/itemProps2.xml><?xml version="1.0" encoding="utf-8"?>
-<ds:datastoreItem xmlns:ds="http://schemas.openxmlformats.org/officeDocument/2006/customXml" ds:itemID="{B72FCBA9-0E7F-4D64-B543-2B2870B85E8B}">
-  <ds:schemaRefs>
-    <ds:schemaRef ds:uri="http://schemas.microsoft.com/sharepoint/v3/contenttype/forms"/>
-  </ds:schemaRefs>
-</ds:datastoreItem>
+<file path=customXml/item3.xml><?xml version="1.0" encoding="utf-8"?>
+<p:properties xmlns:p="http://schemas.microsoft.com/office/2006/metadata/properties" xmlns:xsi="http://www.w3.org/2001/XMLSchema-instance" xmlns:pc="http://schemas.microsoft.com/office/infopath/2007/PartnerControls">
+  <documentManagement>
+    <SharedWithUsers xmlns="a0705aab-28ed-4f14-9e72-801ff7570ecf">
+      <UserInfo>
+        <DisplayName/>
+        <AccountId xsi:nil="true"/>
+        <AccountType/>
+      </UserInfo>
+    </SharedWithUsers>
+  </documentManagement>
+</p:properties>
 </file>
 
-<file path=customXml/itemProps3.xml><?xml version="1.0" encoding="utf-8"?>
+<file path=customXml/itemProps1.xml><?xml version="1.0" encoding="utf-8"?>
 <ds:datastoreItem xmlns:ds="http://schemas.openxmlformats.org/officeDocument/2006/customXml" ds:itemID="{2FC737D2-C1B5-44D0-A2B8-92C1B285B18D}">
   <ds:schemaRefs>
     <ds:schemaRef ds:uri="http://schemas.microsoft.com/office/2006/metadata/contentType"/>
@@ -25048,4 +25055,28 @@
     <ds:schemaRef ds:uri="http://schemas.microsoft.com/internal/obd"/>
   </ds:schemaRefs>
 </ds:datastoreItem>
+</file>
+
+<file path=customXml/itemProps2.xml><?xml version="1.0" encoding="utf-8"?>
+<ds:datastoreItem xmlns:ds="http://schemas.openxmlformats.org/officeDocument/2006/customXml" ds:itemID="{B72FCBA9-0E7F-4D64-B543-2B2870B85E8B}">
+  <ds:schemaRefs>
+    <ds:schemaRef ds:uri="http://schemas.microsoft.com/sharepoint/v3/contenttype/forms"/>
+  </ds:schemaRefs>
+</ds:datastoreItem>
+</file>
+
+<file path=customXml/itemProps3.xml><?xml version="1.0" encoding="utf-8"?>
+<ds:datastoreItem xmlns:ds="http://schemas.openxmlformats.org/officeDocument/2006/customXml" ds:itemID="{1B9FA1EF-CD23-4139-920B-9EDB05CD48C7}">
+  <ds:schemaRefs>
+    <ds:schemaRef ds:uri="http://purl.org/dc/terms/"/>
+    <ds:schemaRef ds:uri="a0705aab-28ed-4f14-9e72-801ff7570ecf"/>
+    <ds:schemaRef ds:uri="http://schemas.microsoft.com/office/infopath/2007/PartnerControls"/>
+    <ds:schemaRef ds:uri="http://purl.org/dc/elements/1.1/"/>
+    <ds:schemaRef ds:uri="http://purl.org/dc/dcmitype/"/>
+    <ds:schemaRef ds:uri="http://schemas.microsoft.com/office/2006/documentManagement/types"/>
+    <ds:schemaRef ds:uri="http://schemas.openxmlformats.org/package/2006/metadata/core-properties"/>
+    <ds:schemaRef ds:uri="http://schemas.microsoft.com/office/2006/metadata/properties"/>
+    <ds:schemaRef ds:uri="http://www.w3.org/XML/1998/namespace"/>
+  </ds:schemaRefs>
+</ds:datastoreItem>
 </file>
</xml_diff>